<commit_message>
DTN - next iteration
</commit_message>
<xml_diff>
--- a/DTN/DTN-London-IETF-101.pptx
+++ b/DTN/DTN-London-IETF-101.pptx
@@ -4402,8 +4402,8 @@
         </p:nvSpPr>
         <p:spPr>
           <a:xfrm>
-            <a:off x="331260" y="133350"/>
-            <a:ext cx="4431240" cy="1324890"/>
+            <a:off x="152400" y="133350"/>
+            <a:ext cx="5029200" cy="1324890"/>
           </a:xfrm>
           <a:prstGeom prst="rect">
             <a:avLst/>
@@ -4431,6 +4431,36 @@
           <a:p>
             <a:pPr algn="ctr"/>
             <a:r>
+              <a:rPr lang="en-US" sz="2800" b="1" spc="-1" dirty="0" smtClean="0">
+                <a:solidFill>
+                  <a:srgbClr val="000000"/>
+                </a:solidFill>
+                <a:uFill>
+                  <a:solidFill>
+                    <a:srgbClr val="FFFFFF"/>
+                  </a:solidFill>
+                </a:uFill>
+                <a:latin typeface="Calibri"/>
+                <a:ea typeface="Calibri"/>
+              </a:rPr>
+              <a:t>Internet in Space</a:t>
+            </a:r>
+            <a:endParaRPr lang="en-US" sz="2800" b="1" strike="noStrike" spc="-1" dirty="0" smtClean="0">
+              <a:solidFill>
+                <a:srgbClr val="000000"/>
+              </a:solidFill>
+              <a:uFill>
+                <a:solidFill>
+                  <a:srgbClr val="FFFFFF"/>
+                </a:solidFill>
+              </a:uFill>
+              <a:latin typeface="Calibri"/>
+              <a:ea typeface="Calibri"/>
+            </a:endParaRPr>
+          </a:p>
+          <a:p>
+            <a:pPr algn="ctr"/>
+            <a:r>
               <a:rPr lang="en-US" sz="2800" b="1" strike="noStrike" spc="-1" dirty="0" smtClean="0">
                 <a:solidFill>
                   <a:srgbClr val="000000"/>
@@ -4443,11 +4473,8 @@
                 <a:latin typeface="Calibri"/>
                 <a:ea typeface="Calibri"/>
               </a:rPr>
-              <a:t>DTN</a:t>
-            </a:r>
-          </a:p>
-          <a:p>
-            <a:pPr algn="ctr"/>
+              <a:t>DTN - Delay </a:t>
+            </a:r>
             <a:r>
               <a:rPr lang="en-US" sz="2800" b="1" strike="noStrike" spc="-1" dirty="0" smtClean="0">
                 <a:solidFill>
@@ -4461,7 +4488,7 @@
                 <a:latin typeface="Calibri"/>
                 <a:ea typeface="Calibri"/>
               </a:rPr>
-              <a:t>Delay Tolerant Networking</a:t>
+              <a:t>Tolerant Networking</a:t>
             </a:r>
             <a:endParaRPr lang="en-US" sz="2800" b="1" strike="noStrike" spc="-1" dirty="0">
               <a:solidFill>
@@ -4485,8 +4512,8 @@
         </p:nvSpPr>
         <p:spPr>
           <a:xfrm>
-            <a:off x="266889" y="1458240"/>
-            <a:ext cx="4736520" cy="1685160"/>
+            <a:off x="266889" y="1657350"/>
+            <a:ext cx="4736520" cy="1065810"/>
           </a:xfrm>
           <a:prstGeom prst="rect">
             <a:avLst/>
@@ -4703,7 +4730,7 @@
         </p:blipFill>
         <p:spPr bwMode="auto">
           <a:xfrm>
-            <a:off x="1143000" y="2647950"/>
+            <a:off x="1143000" y="3181350"/>
             <a:ext cx="3200400" cy="885463"/>
           </a:xfrm>
           <a:prstGeom prst="rect">
@@ -4767,7 +4794,7 @@
         </p:blipFill>
         <p:spPr bwMode="auto">
           <a:xfrm>
-            <a:off x="1240642" y="3826612"/>
+            <a:off x="1240642" y="4053147"/>
             <a:ext cx="2789014" cy="1033203"/>
           </a:xfrm>
           <a:prstGeom prst="rect">
@@ -6341,22 +6368,7 @@
                 <a:latin typeface="Calibri"/>
                 <a:ea typeface="Calibri"/>
               </a:rPr>
-              <a:t> DTN </a:t>
-            </a:r>
-            <a:r>
-              <a:rPr lang="en-US" sz="2400" b="0" strike="noStrike" spc="-1" dirty="0" smtClean="0">
-                <a:solidFill>
-                  <a:srgbClr val="000000"/>
-                </a:solidFill>
-                <a:uFill>
-                  <a:solidFill>
-                    <a:srgbClr val="FFFFFF"/>
-                  </a:solidFill>
-                </a:uFill>
-                <a:latin typeface="Calibri"/>
-                <a:ea typeface="Calibri"/>
-              </a:rPr>
-              <a:t>TCPCL protocol</a:t>
+              <a:t> DTN TCPCL protocol</a:t>
             </a:r>
             <a:endParaRPr lang="en-US" sz="2000" spc="-1" dirty="0" smtClean="0">
               <a:solidFill>

</xml_diff>